<commit_message>
pdf builderror fix #1353
</commit_message>
<xml_diff>
--- a/source/ArchitectureInDetail/images_Email/materialEmail.pptx
+++ b/source/ArchitectureInDetail/images_Email/materialEmail.pptx
@@ -5,10 +5,11 @@
     <p:sldMasterId id="2147483648" r:id="rId1"/>
   </p:sldMasterIdLst>
   <p:notesMasterIdLst>
-    <p:notesMasterId r:id="rId3"/>
+    <p:notesMasterId r:id="rId4"/>
   </p:notesMasterIdLst>
   <p:sldIdLst>
     <p:sldId id="300" r:id="rId2"/>
+    <p:sldId id="301" r:id="rId3"/>
   </p:sldIdLst>
   <p:sldSz cx="9144000" cy="6858000" type="screen4x3"/>
   <p:notesSz cx="6858000" cy="9144000"/>
@@ -107,6 +108,22 @@
       </a:defRPr>
     </a:lvl9pPr>
   </p:defaultTextStyle>
+  <p:extLst>
+    <p:ext uri="{EFAFB233-063F-42B5-8137-9DF3F51BA10A}">
+      <p15:sldGuideLst xmlns:p15="http://schemas.microsoft.com/office/powerpoint/2012/main">
+        <p15:guide id="1" orient="horz" pos="2160">
+          <p15:clr>
+            <a:srgbClr val="A4A3A4"/>
+          </p15:clr>
+        </p15:guide>
+        <p15:guide id="2" pos="2880">
+          <p15:clr>
+            <a:srgbClr val="A4A3A4"/>
+          </p15:clr>
+        </p15:guide>
+      </p15:sldGuideLst>
+    </p:ext>
+  </p:extLst>
 </p:presentation>
 </file>
 
@@ -193,7 +210,7 @@
             <a:fld id="{3BB47352-BF5A-4CD2-B029-996118CD8E01}" type="datetimeFigureOut">
               <a:rPr kumimoji="1" lang="ja-JP" altLang="en-US" smtClean="0"/>
               <a:pPr/>
-              <a:t>15/09/06</a:t>
+              <a:t>2015/11/18</a:t>
             </a:fld>
             <a:endParaRPr kumimoji="1" lang="ja-JP" altLang="en-US" dirty="0"/>
           </a:p>
@@ -676,7 +693,7 @@
             <a:fld id="{7B9B12EC-6AA0-374B-A2D3-850081A07A26}" type="datetimeFigureOut">
               <a:rPr kumimoji="1" lang="ja-JP" altLang="en-US" smtClean="0"/>
               <a:pPr/>
-              <a:t>15/09/06</a:t>
+              <a:t>2015/11/18</a:t>
             </a:fld>
             <a:endParaRPr kumimoji="1" lang="ja-JP" altLang="en-US" dirty="0"/>
           </a:p>
@@ -880,7 +897,7 @@
             <a:fld id="{7B9B12EC-6AA0-374B-A2D3-850081A07A26}" type="datetimeFigureOut">
               <a:rPr kumimoji="1" lang="ja-JP" altLang="en-US" smtClean="0"/>
               <a:pPr/>
-              <a:t>15/09/06</a:t>
+              <a:t>2015/11/18</a:t>
             </a:fld>
             <a:endParaRPr kumimoji="1" lang="ja-JP" altLang="en-US" dirty="0"/>
           </a:p>
@@ -1094,7 +1111,7 @@
             <a:fld id="{7B9B12EC-6AA0-374B-A2D3-850081A07A26}" type="datetimeFigureOut">
               <a:rPr kumimoji="1" lang="ja-JP" altLang="en-US" smtClean="0"/>
               <a:pPr/>
-              <a:t>15/09/06</a:t>
+              <a:t>2015/11/18</a:t>
             </a:fld>
             <a:endParaRPr kumimoji="1" lang="ja-JP" altLang="en-US" dirty="0"/>
           </a:p>
@@ -1298,7 +1315,7 @@
             <a:fld id="{7B9B12EC-6AA0-374B-A2D3-850081A07A26}" type="datetimeFigureOut">
               <a:rPr kumimoji="1" lang="ja-JP" altLang="en-US" smtClean="0"/>
               <a:pPr/>
-              <a:t>15/09/06</a:t>
+              <a:t>2015/11/18</a:t>
             </a:fld>
             <a:endParaRPr kumimoji="1" lang="ja-JP" altLang="en-US" dirty="0"/>
           </a:p>
@@ -1546,7 +1563,7 @@
             <a:fld id="{7B9B12EC-6AA0-374B-A2D3-850081A07A26}" type="datetimeFigureOut">
               <a:rPr kumimoji="1" lang="ja-JP" altLang="en-US" smtClean="0"/>
               <a:pPr/>
-              <a:t>15/09/06</a:t>
+              <a:t>2015/11/18</a:t>
             </a:fld>
             <a:endParaRPr kumimoji="1" lang="ja-JP" altLang="en-US" dirty="0"/>
           </a:p>
@@ -1900,7 +1917,7 @@
             <a:fld id="{7B9B12EC-6AA0-374B-A2D3-850081A07A26}" type="datetimeFigureOut">
               <a:rPr kumimoji="1" lang="ja-JP" altLang="en-US" smtClean="0"/>
               <a:pPr/>
-              <a:t>15/09/06</a:t>
+              <a:t>2015/11/18</a:t>
             </a:fld>
             <a:endParaRPr kumimoji="1" lang="ja-JP" altLang="en-US" dirty="0"/>
           </a:p>
@@ -2388,7 +2405,7 @@
             <a:fld id="{7B9B12EC-6AA0-374B-A2D3-850081A07A26}" type="datetimeFigureOut">
               <a:rPr kumimoji="1" lang="ja-JP" altLang="en-US" smtClean="0"/>
               <a:pPr/>
-              <a:t>15/09/06</a:t>
+              <a:t>2015/11/18</a:t>
             </a:fld>
             <a:endParaRPr kumimoji="1" lang="ja-JP" altLang="en-US" dirty="0"/>
           </a:p>
@@ -2508,7 +2525,7 @@
             <a:fld id="{7B9B12EC-6AA0-374B-A2D3-850081A07A26}" type="datetimeFigureOut">
               <a:rPr kumimoji="1" lang="ja-JP" altLang="en-US" smtClean="0"/>
               <a:pPr/>
-              <a:t>15/09/06</a:t>
+              <a:t>2015/11/18</a:t>
             </a:fld>
             <a:endParaRPr kumimoji="1" lang="ja-JP" altLang="en-US" dirty="0"/>
           </a:p>
@@ -2605,7 +2622,7 @@
             <a:fld id="{7B9B12EC-6AA0-374B-A2D3-850081A07A26}" type="datetimeFigureOut">
               <a:rPr kumimoji="1" lang="ja-JP" altLang="en-US" smtClean="0"/>
               <a:pPr/>
-              <a:t>15/09/06</a:t>
+              <a:t>2015/11/18</a:t>
             </a:fld>
             <a:endParaRPr kumimoji="1" lang="ja-JP" altLang="en-US" dirty="0"/>
           </a:p>
@@ -2916,7 +2933,7 @@
             <a:fld id="{7B9B12EC-6AA0-374B-A2D3-850081A07A26}" type="datetimeFigureOut">
               <a:rPr kumimoji="1" lang="ja-JP" altLang="en-US" smtClean="0"/>
               <a:pPr/>
-              <a:t>15/09/06</a:t>
+              <a:t>2015/11/18</a:t>
             </a:fld>
             <a:endParaRPr kumimoji="1" lang="ja-JP" altLang="en-US" dirty="0"/>
           </a:p>
@@ -3171,7 +3188,7 @@
             <a:fld id="{7B9B12EC-6AA0-374B-A2D3-850081A07A26}" type="datetimeFigureOut">
               <a:rPr kumimoji="1" lang="ja-JP" altLang="en-US" smtClean="0"/>
               <a:pPr/>
-              <a:t>15/09/06</a:t>
+              <a:t>2015/11/18</a:t>
             </a:fld>
             <a:endParaRPr kumimoji="1" lang="ja-JP" altLang="en-US" dirty="0"/>
           </a:p>
@@ -3418,7 +3435,7 @@
             <a:fld id="{7B9B12EC-6AA0-374B-A2D3-850081A07A26}" type="datetimeFigureOut">
               <a:rPr kumimoji="1" lang="ja-JP" altLang="en-US" smtClean="0"/>
               <a:pPr/>
-              <a:t>15/09/06</a:t>
+              <a:t>2015/11/18</a:t>
             </a:fld>
             <a:endParaRPr kumimoji="1" lang="ja-JP" altLang="en-US" dirty="0"/>
           </a:p>
@@ -4001,24 +4018,7 @@
                   </a:outerShdw>
                 </a:effectLst>
               </a:rPr>
-              <a:t>(</a:t>
-            </a:r>
-            <a:r>
-              <a:rPr lang="en-US" altLang="ja-JP" sz="2400" dirty="0" smtClean="0">
-                <a:solidFill>
-                  <a:schemeClr val="accent3">
-                    <a:lumMod val="75000"/>
-                  </a:schemeClr>
-                </a:solidFill>
-                <a:effectLst>
-                  <a:outerShdw blurRad="38100" dist="38100" dir="2700000" algn="tl">
-                    <a:srgbClr val="000000">
-                      <a:alpha val="43137"/>
-                    </a:srgbClr>
-                  </a:outerShdw>
-                </a:effectLst>
-              </a:rPr>
-              <a:t>SMTP</a:t>
+              <a:t>(SMTP</a:t>
             </a:r>
             <a:r>
               <a:rPr lang="en-US" altLang="en-US" sz="2400" dirty="0">
@@ -4052,24 +4052,7 @@
                   </a:outerShdw>
                 </a:effectLst>
               </a:rPr>
-              <a:t>Server</a:t>
-            </a:r>
-            <a:r>
-              <a:rPr lang="en-US" altLang="ja-JP" sz="2400" dirty="0" smtClean="0">
-                <a:solidFill>
-                  <a:schemeClr val="accent3">
-                    <a:lumMod val="75000"/>
-                  </a:schemeClr>
-                </a:solidFill>
-                <a:effectLst>
-                  <a:outerShdw blurRad="38100" dist="38100" dir="2700000" algn="tl">
-                    <a:srgbClr val="000000">
-                      <a:alpha val="43137"/>
-                    </a:srgbClr>
-                  </a:outerShdw>
-                </a:effectLst>
-              </a:rPr>
-              <a:t>)</a:t>
+              <a:t>Server)</a:t>
             </a:r>
             <a:endParaRPr kumimoji="1" lang="ja-JP" altLang="en-US" sz="2400" dirty="0">
               <a:solidFill>
@@ -4968,11 +4951,7 @@
             <a:pPr algn="ctr"/>
             <a:r>
               <a:rPr lang="en-US" altLang="ja-JP" sz="2000" dirty="0" err="1" smtClean="0"/>
-              <a:t>Mail</a:t>
-            </a:r>
-            <a:r>
-              <a:rPr lang="en-US" altLang="ja-JP" sz="2000" dirty="0" err="1" smtClean="0"/>
-              <a:t>Message</a:t>
+              <a:t>MailMessage</a:t>
             </a:r>
             <a:endParaRPr lang="en-US" altLang="ja-JP" sz="2000" dirty="0" smtClean="0"/>
           </a:p>
@@ -5166,18 +5145,7 @@
                   </a:schemeClr>
                 </a:solidFill>
               </a:rPr>
-              <a:t>Mail</a:t>
-            </a:r>
-            <a:r>
-              <a:rPr lang="en-US" altLang="ja-JP" b="1" dirty="0" smtClean="0">
-                <a:solidFill>
-                  <a:schemeClr val="tx1">
-                    <a:lumMod val="65000"/>
-                    <a:lumOff val="35000"/>
-                  </a:schemeClr>
-                </a:solidFill>
-              </a:rPr>
-              <a:t> API</a:t>
+              <a:t>Mail API</a:t>
             </a:r>
             <a:endParaRPr lang="en-US" altLang="ja-JP" b="1" dirty="0">
               <a:solidFill>
@@ -5472,11 +5440,7 @@
             <a:pPr algn="ctr"/>
             <a:r>
               <a:rPr lang="en-US" altLang="ja-JP" sz="2000" dirty="0" err="1" smtClean="0"/>
-              <a:t>My</a:t>
-            </a:r>
-            <a:r>
-              <a:rPr lang="en-US" altLang="ja-JP" sz="2000" dirty="0" err="1" smtClean="0"/>
-              <a:t>Mime</a:t>
+              <a:t>MyMime</a:t>
             </a:r>
             <a:endParaRPr lang="en-US" altLang="ja-JP" sz="2000" dirty="0" smtClean="0"/>
           </a:p>
@@ -5769,10 +5733,757 @@
   <p:timing>
     <p:tnLst>
       <p:par>
-        <p:cTn xmlns:p14="http://schemas.microsoft.com/office/powerpoint/2010/main" id="1" dur="indefinite" restart="never" nodeType="tmRoot"/>
+        <p:cTn id="1" dur="indefinite" restart="never" nodeType="tmRoot"/>
       </p:par>
     </p:tnLst>
   </p:timing>
+</p:sld>
+</file>
+
+<file path=ppt/slides/slide2.xml><?xml version="1.0" encoding="utf-8"?>
+<p:sld xmlns:a="http://schemas.openxmlformats.org/drawingml/2006/main" xmlns:r="http://schemas.openxmlformats.org/officeDocument/2006/relationships" xmlns:p="http://schemas.openxmlformats.org/presentationml/2006/main">
+  <p:cSld>
+    <p:spTree>
+      <p:nvGrpSpPr>
+        <p:cNvPr id="1" name=""/>
+        <p:cNvGrpSpPr/>
+        <p:nvPr/>
+      </p:nvGrpSpPr>
+      <p:grpSpPr>
+        <a:xfrm>
+          <a:off x="0" y="0"/>
+          <a:ext cx="0" cy="0"/>
+          <a:chOff x="0" y="0"/>
+          <a:chExt cx="0" cy="0"/>
+        </a:xfrm>
+      </p:grpSpPr>
+      <p:graphicFrame>
+        <p:nvGraphicFramePr>
+          <p:cNvPr id="5" name="表 4"/>
+          <p:cNvGraphicFramePr>
+            <a:graphicFrameLocks noGrp="1"/>
+          </p:cNvGraphicFramePr>
+          <p:nvPr>
+            <p:extLst>
+              <p:ext uri="{D42A27DB-BD31-4B8C-83A1-F6EECF244321}">
+                <p14:modId xmlns:p14="http://schemas.microsoft.com/office/powerpoint/2010/main" val="3611546728"/>
+              </p:ext>
+            </p:extLst>
+          </p:nvPr>
+        </p:nvGraphicFramePr>
+        <p:xfrm>
+          <a:off x="818868" y="2707184"/>
+          <a:ext cx="7629093" cy="1483360"/>
+        </p:xfrm>
+        <a:graphic>
+          <a:graphicData uri="http://schemas.openxmlformats.org/drawingml/2006/table">
+            <a:tbl>
+              <a:tblPr firstRow="1" bandRow="1">
+                <a:tableStyleId>{5C22544A-7EE6-4342-B048-85BDC9FD1C3A}</a:tableStyleId>
+              </a:tblPr>
+              <a:tblGrid>
+                <a:gridCol w="847677"/>
+                <a:gridCol w="847677"/>
+                <a:gridCol w="847677"/>
+                <a:gridCol w="847677"/>
+                <a:gridCol w="847677"/>
+                <a:gridCol w="847677"/>
+                <a:gridCol w="847677"/>
+                <a:gridCol w="847677"/>
+                <a:gridCol w="847677"/>
+              </a:tblGrid>
+              <a:tr h="370840">
+                <a:tc gridSpan="9">
+                  <a:txBody>
+                    <a:bodyPr/>
+                    <a:lstStyle/>
+                    <a:p>
+                      <a:pPr algn="ctr"/>
+                      <a:r>
+                        <a:rPr kumimoji="1" lang="ja-JP" altLang="en-US" dirty="0" smtClean="0">
+                          <a:solidFill>
+                            <a:schemeClr val="tx1"/>
+                          </a:solidFill>
+                        </a:rPr>
+                        <a:t>範囲外となる拡張文字の例</a:t>
+                      </a:r>
+                      <a:endParaRPr kumimoji="1" lang="ja-JP" altLang="en-US" dirty="0">
+                        <a:solidFill>
+                          <a:schemeClr val="tx1"/>
+                        </a:solidFill>
+                      </a:endParaRPr>
+                    </a:p>
+                  </a:txBody>
+                  <a:tcPr/>
+                </a:tc>
+                <a:tc hMerge="1">
+                  <a:txBody>
+                    <a:bodyPr/>
+                    <a:lstStyle/>
+                    <a:p>
+                      <a:endParaRPr kumimoji="1" lang="ja-JP" altLang="en-US" dirty="0"/>
+                    </a:p>
+                  </a:txBody>
+                  <a:tcPr/>
+                </a:tc>
+                <a:tc hMerge="1">
+                  <a:txBody>
+                    <a:bodyPr/>
+                    <a:lstStyle/>
+                    <a:p>
+                      <a:endParaRPr kumimoji="1" lang="ja-JP" altLang="en-US" dirty="0"/>
+                    </a:p>
+                  </a:txBody>
+                  <a:tcPr/>
+                </a:tc>
+                <a:tc hMerge="1">
+                  <a:txBody>
+                    <a:bodyPr/>
+                    <a:lstStyle/>
+                    <a:p>
+                      <a:endParaRPr kumimoji="1" lang="ja-JP" altLang="en-US" dirty="0"/>
+                    </a:p>
+                  </a:txBody>
+                  <a:tcPr/>
+                </a:tc>
+                <a:tc hMerge="1">
+                  <a:txBody>
+                    <a:bodyPr/>
+                    <a:lstStyle/>
+                    <a:p>
+                      <a:endParaRPr kumimoji="1" lang="ja-JP" altLang="en-US" dirty="0"/>
+                    </a:p>
+                  </a:txBody>
+                  <a:tcPr/>
+                </a:tc>
+                <a:tc hMerge="1">
+                  <a:txBody>
+                    <a:bodyPr/>
+                    <a:lstStyle/>
+                    <a:p>
+                      <a:endParaRPr kumimoji="1" lang="ja-JP" altLang="en-US" dirty="0"/>
+                    </a:p>
+                  </a:txBody>
+                  <a:tcPr/>
+                </a:tc>
+                <a:tc hMerge="1">
+                  <a:txBody>
+                    <a:bodyPr/>
+                    <a:lstStyle/>
+                    <a:p>
+                      <a:endParaRPr kumimoji="1" lang="ja-JP" altLang="en-US" dirty="0"/>
+                    </a:p>
+                  </a:txBody>
+                  <a:tcPr/>
+                </a:tc>
+                <a:tc hMerge="1">
+                  <a:txBody>
+                    <a:bodyPr/>
+                    <a:lstStyle/>
+                    <a:p>
+                      <a:endParaRPr kumimoji="1" lang="ja-JP" altLang="en-US" dirty="0"/>
+                    </a:p>
+                  </a:txBody>
+                  <a:tcPr/>
+                </a:tc>
+                <a:tc hMerge="1">
+                  <a:txBody>
+                    <a:bodyPr/>
+                    <a:lstStyle/>
+                    <a:p>
+                      <a:endParaRPr kumimoji="1" lang="ja-JP" altLang="en-US" dirty="0"/>
+                    </a:p>
+                  </a:txBody>
+                  <a:tcPr/>
+                </a:tc>
+              </a:tr>
+              <a:tr h="370840">
+                <a:tc>
+                  <a:txBody>
+                    <a:bodyPr/>
+                    <a:lstStyle/>
+                    <a:p>
+                      <a:pPr algn="ctr"/>
+                      <a:r>
+                        <a:rPr kumimoji="1" lang="ja-JP" altLang="en-US" dirty="0" smtClean="0">
+                          <a:latin typeface="+mn-ea"/>
+                          <a:ea typeface="+mn-ea"/>
+                        </a:rPr>
+                        <a:t>①</a:t>
+                      </a:r>
+                      <a:endParaRPr kumimoji="1" lang="ja-JP" altLang="en-US" dirty="0">
+                        <a:latin typeface="+mn-ea"/>
+                        <a:ea typeface="+mn-ea"/>
+                      </a:endParaRPr>
+                    </a:p>
+                  </a:txBody>
+                  <a:tcPr/>
+                </a:tc>
+                <a:tc>
+                  <a:txBody>
+                    <a:bodyPr/>
+                    <a:lstStyle/>
+                    <a:p>
+                      <a:pPr algn="ctr"/>
+                      <a:r>
+                        <a:rPr kumimoji="1" lang="ja-JP" altLang="en-US" dirty="0" smtClean="0">
+                          <a:latin typeface="+mn-ea"/>
+                          <a:ea typeface="+mn-ea"/>
+                        </a:rPr>
+                        <a:t>②</a:t>
+                      </a:r>
+                      <a:endParaRPr kumimoji="1" lang="ja-JP" altLang="en-US" dirty="0">
+                        <a:latin typeface="+mn-ea"/>
+                        <a:ea typeface="+mn-ea"/>
+                      </a:endParaRPr>
+                    </a:p>
+                  </a:txBody>
+                  <a:tcPr/>
+                </a:tc>
+                <a:tc>
+                  <a:txBody>
+                    <a:bodyPr/>
+                    <a:lstStyle/>
+                    <a:p>
+                      <a:pPr algn="ctr"/>
+                      <a:r>
+                        <a:rPr kumimoji="1" lang="ja-JP" altLang="en-US" dirty="0" smtClean="0">
+                          <a:latin typeface="+mn-ea"/>
+                          <a:ea typeface="+mn-ea"/>
+                        </a:rPr>
+                        <a:t>③</a:t>
+                      </a:r>
+                      <a:endParaRPr kumimoji="1" lang="ja-JP" altLang="en-US" dirty="0">
+                        <a:latin typeface="+mn-ea"/>
+                        <a:ea typeface="+mn-ea"/>
+                      </a:endParaRPr>
+                    </a:p>
+                  </a:txBody>
+                  <a:tcPr/>
+                </a:tc>
+                <a:tc>
+                  <a:txBody>
+                    <a:bodyPr/>
+                    <a:lstStyle/>
+                    <a:p>
+                      <a:pPr algn="ctr"/>
+                      <a:r>
+                        <a:rPr lang="en-US" altLang="ja-JP" dirty="0" smtClean="0">
+                          <a:latin typeface="+mn-ea"/>
+                          <a:ea typeface="+mn-ea"/>
+                        </a:rPr>
+                        <a:t>Ⅰ</a:t>
+                      </a:r>
+                      <a:endParaRPr lang="en-US" altLang="ja-JP" dirty="0">
+                        <a:latin typeface="+mn-ea"/>
+                        <a:ea typeface="+mn-ea"/>
+                      </a:endParaRPr>
+                    </a:p>
+                  </a:txBody>
+                  <a:tcPr/>
+                </a:tc>
+                <a:tc>
+                  <a:txBody>
+                    <a:bodyPr/>
+                    <a:lstStyle/>
+                    <a:p>
+                      <a:pPr algn="ctr"/>
+                      <a:r>
+                        <a:rPr lang="en-US" altLang="ja-JP" dirty="0" smtClean="0">
+                          <a:latin typeface="+mn-ea"/>
+                          <a:ea typeface="+mn-ea"/>
+                        </a:rPr>
+                        <a:t>Ⅱ</a:t>
+                      </a:r>
+                      <a:endParaRPr lang="en-US" altLang="ja-JP" dirty="0">
+                        <a:latin typeface="+mn-ea"/>
+                        <a:ea typeface="+mn-ea"/>
+                      </a:endParaRPr>
+                    </a:p>
+                  </a:txBody>
+                  <a:tcPr/>
+                </a:tc>
+                <a:tc>
+                  <a:txBody>
+                    <a:bodyPr/>
+                    <a:lstStyle/>
+                    <a:p>
+                      <a:pPr algn="ctr"/>
+                      <a:r>
+                        <a:rPr lang="en-US" altLang="ja-JP" dirty="0" smtClean="0">
+                          <a:latin typeface="+mn-ea"/>
+                          <a:ea typeface="+mn-ea"/>
+                        </a:rPr>
+                        <a:t>Ⅲ</a:t>
+                      </a:r>
+                      <a:endParaRPr lang="en-US" altLang="ja-JP" dirty="0">
+                        <a:latin typeface="+mn-ea"/>
+                        <a:ea typeface="+mn-ea"/>
+                      </a:endParaRPr>
+                    </a:p>
+                  </a:txBody>
+                  <a:tcPr/>
+                </a:tc>
+                <a:tc>
+                  <a:txBody>
+                    <a:bodyPr/>
+                    <a:lstStyle/>
+                    <a:p>
+                      <a:pPr algn="ctr"/>
+                      <a:r>
+                        <a:rPr kumimoji="1" lang="ja-JP" altLang="en-US" dirty="0" smtClean="0">
+                          <a:latin typeface="+mn-ea"/>
+                          <a:ea typeface="+mn-ea"/>
+                        </a:rPr>
+                        <a:t>㍉</a:t>
+                      </a:r>
+                      <a:endParaRPr kumimoji="1" lang="ja-JP" altLang="en-US" dirty="0">
+                        <a:latin typeface="+mn-ea"/>
+                        <a:ea typeface="+mn-ea"/>
+                      </a:endParaRPr>
+                    </a:p>
+                  </a:txBody>
+                  <a:tcPr/>
+                </a:tc>
+                <a:tc>
+                  <a:txBody>
+                    <a:bodyPr/>
+                    <a:lstStyle/>
+                    <a:p>
+                      <a:pPr algn="ctr"/>
+                      <a:r>
+                        <a:rPr kumimoji="1" lang="ja-JP" altLang="en-US" dirty="0" smtClean="0">
+                          <a:latin typeface="+mn-ea"/>
+                          <a:ea typeface="+mn-ea"/>
+                        </a:rPr>
+                        <a:t>㌔</a:t>
+                      </a:r>
+                      <a:endParaRPr kumimoji="1" lang="ja-JP" altLang="en-US" dirty="0">
+                        <a:latin typeface="+mn-ea"/>
+                        <a:ea typeface="+mn-ea"/>
+                      </a:endParaRPr>
+                    </a:p>
+                  </a:txBody>
+                  <a:tcPr/>
+                </a:tc>
+                <a:tc>
+                  <a:txBody>
+                    <a:bodyPr/>
+                    <a:lstStyle/>
+                    <a:p>
+                      <a:pPr algn="ctr"/>
+                      <a:r>
+                        <a:rPr kumimoji="1" lang="ja-JP" altLang="en-US" dirty="0" smtClean="0">
+                          <a:latin typeface="+mn-ea"/>
+                          <a:ea typeface="+mn-ea"/>
+                        </a:rPr>
+                        <a:t>㌢</a:t>
+                      </a:r>
+                      <a:endParaRPr kumimoji="1" lang="ja-JP" altLang="en-US" dirty="0">
+                        <a:latin typeface="+mn-ea"/>
+                        <a:ea typeface="+mn-ea"/>
+                      </a:endParaRPr>
+                    </a:p>
+                  </a:txBody>
+                  <a:tcPr/>
+                </a:tc>
+              </a:tr>
+              <a:tr h="370840">
+                <a:tc>
+                  <a:txBody>
+                    <a:bodyPr/>
+                    <a:lstStyle/>
+                    <a:p>
+                      <a:pPr algn="ctr"/>
+                      <a:r>
+                        <a:rPr kumimoji="1" lang="ja-JP" altLang="en-US" dirty="0" smtClean="0">
+                          <a:latin typeface="+mn-ea"/>
+                          <a:ea typeface="+mn-ea"/>
+                        </a:rPr>
+                        <a:t>㎜</a:t>
+                      </a:r>
+                      <a:endParaRPr kumimoji="1" lang="ja-JP" altLang="en-US" dirty="0">
+                        <a:latin typeface="+mn-ea"/>
+                        <a:ea typeface="+mn-ea"/>
+                      </a:endParaRPr>
+                    </a:p>
+                  </a:txBody>
+                  <a:tcPr/>
+                </a:tc>
+                <a:tc>
+                  <a:txBody>
+                    <a:bodyPr/>
+                    <a:lstStyle/>
+                    <a:p>
+                      <a:pPr algn="ctr"/>
+                      <a:r>
+                        <a:rPr kumimoji="1" lang="ja-JP" altLang="en-US" dirty="0" smtClean="0">
+                          <a:latin typeface="+mn-ea"/>
+                          <a:ea typeface="+mn-ea"/>
+                        </a:rPr>
+                        <a:t>㎝</a:t>
+                      </a:r>
+                      <a:endParaRPr kumimoji="1" lang="ja-JP" altLang="en-US" dirty="0">
+                        <a:latin typeface="+mn-ea"/>
+                        <a:ea typeface="+mn-ea"/>
+                      </a:endParaRPr>
+                    </a:p>
+                  </a:txBody>
+                  <a:tcPr/>
+                </a:tc>
+                <a:tc>
+                  <a:txBody>
+                    <a:bodyPr/>
+                    <a:lstStyle/>
+                    <a:p>
+                      <a:pPr algn="ctr"/>
+                      <a:r>
+                        <a:rPr kumimoji="1" lang="ja-JP" altLang="en-US" dirty="0" smtClean="0">
+                          <a:latin typeface="+mn-ea"/>
+                          <a:ea typeface="+mn-ea"/>
+                        </a:rPr>
+                        <a:t>㎞</a:t>
+                      </a:r>
+                      <a:endParaRPr kumimoji="1" lang="ja-JP" altLang="en-US" dirty="0">
+                        <a:latin typeface="+mn-ea"/>
+                        <a:ea typeface="+mn-ea"/>
+                      </a:endParaRPr>
+                    </a:p>
+                  </a:txBody>
+                  <a:tcPr/>
+                </a:tc>
+                <a:tc>
+                  <a:txBody>
+                    <a:bodyPr/>
+                    <a:lstStyle/>
+                    <a:p>
+                      <a:pPr algn="ctr"/>
+                      <a:r>
+                        <a:rPr kumimoji="1" lang="ja-JP" altLang="en-US" dirty="0" smtClean="0">
+                          <a:latin typeface="+mn-ea"/>
+                          <a:ea typeface="+mn-ea"/>
+                        </a:rPr>
+                        <a:t>㍽</a:t>
+                      </a:r>
+                      <a:endParaRPr kumimoji="1" lang="ja-JP" altLang="en-US" dirty="0">
+                        <a:latin typeface="+mn-ea"/>
+                        <a:ea typeface="+mn-ea"/>
+                      </a:endParaRPr>
+                    </a:p>
+                  </a:txBody>
+                  <a:tcPr/>
+                </a:tc>
+                <a:tc>
+                  <a:txBody>
+                    <a:bodyPr/>
+                    <a:lstStyle/>
+                    <a:p>
+                      <a:pPr algn="ctr"/>
+                      <a:r>
+                        <a:rPr kumimoji="1" lang="ja-JP" altLang="en-US" dirty="0" smtClean="0">
+                          <a:latin typeface="+mn-ea"/>
+                          <a:ea typeface="+mn-ea"/>
+                        </a:rPr>
+                        <a:t>㍼</a:t>
+                      </a:r>
+                      <a:endParaRPr kumimoji="1" lang="ja-JP" altLang="en-US" dirty="0">
+                        <a:latin typeface="+mn-ea"/>
+                        <a:ea typeface="+mn-ea"/>
+                      </a:endParaRPr>
+                    </a:p>
+                  </a:txBody>
+                  <a:tcPr/>
+                </a:tc>
+                <a:tc>
+                  <a:txBody>
+                    <a:bodyPr/>
+                    <a:lstStyle/>
+                    <a:p>
+                      <a:pPr algn="ctr"/>
+                      <a:r>
+                        <a:rPr kumimoji="1" lang="ja-JP" altLang="en-US" dirty="0" smtClean="0">
+                          <a:latin typeface="+mn-ea"/>
+                          <a:ea typeface="+mn-ea"/>
+                        </a:rPr>
+                        <a:t>㍻</a:t>
+                      </a:r>
+                      <a:endParaRPr kumimoji="1" lang="ja-JP" altLang="en-US" dirty="0">
+                        <a:latin typeface="+mn-ea"/>
+                        <a:ea typeface="+mn-ea"/>
+                      </a:endParaRPr>
+                    </a:p>
+                  </a:txBody>
+                  <a:tcPr/>
+                </a:tc>
+                <a:tc>
+                  <a:txBody>
+                    <a:bodyPr/>
+                    <a:lstStyle/>
+                    <a:p>
+                      <a:pPr algn="ctr"/>
+                      <a:r>
+                        <a:rPr kumimoji="1" lang="ja-JP" altLang="en-US" dirty="0" smtClean="0">
+                          <a:latin typeface="+mn-ea"/>
+                          <a:ea typeface="+mn-ea"/>
+                        </a:rPr>
+                        <a:t>№</a:t>
+                      </a:r>
+                      <a:endParaRPr kumimoji="1" lang="ja-JP" altLang="en-US" dirty="0">
+                        <a:latin typeface="+mn-ea"/>
+                        <a:ea typeface="+mn-ea"/>
+                      </a:endParaRPr>
+                    </a:p>
+                  </a:txBody>
+                  <a:tcPr/>
+                </a:tc>
+                <a:tc>
+                  <a:txBody>
+                    <a:bodyPr/>
+                    <a:lstStyle/>
+                    <a:p>
+                      <a:pPr algn="ctr"/>
+                      <a:r>
+                        <a:rPr lang="ja-JP" altLang="en-US" dirty="0" smtClean="0">
+                          <a:latin typeface="+mn-ea"/>
+                          <a:ea typeface="+mn-ea"/>
+                        </a:rPr>
+                        <a:t>㏍</a:t>
+                      </a:r>
+                      <a:endParaRPr kumimoji="1" lang="ja-JP" altLang="en-US" dirty="0">
+                        <a:latin typeface="+mn-ea"/>
+                        <a:ea typeface="+mn-ea"/>
+                      </a:endParaRPr>
+                    </a:p>
+                  </a:txBody>
+                  <a:tcPr/>
+                </a:tc>
+                <a:tc>
+                  <a:txBody>
+                    <a:bodyPr/>
+                    <a:lstStyle/>
+                    <a:p>
+                      <a:pPr algn="ctr"/>
+                      <a:r>
+                        <a:rPr lang="ja-JP" altLang="en-US" dirty="0" smtClean="0">
+                          <a:latin typeface="+mn-ea"/>
+                          <a:ea typeface="+mn-ea"/>
+                        </a:rPr>
+                        <a:t>℡</a:t>
+                      </a:r>
+                      <a:endParaRPr kumimoji="1" lang="ja-JP" altLang="en-US" dirty="0">
+                        <a:latin typeface="+mn-ea"/>
+                        <a:ea typeface="+mn-ea"/>
+                      </a:endParaRPr>
+                    </a:p>
+                  </a:txBody>
+                  <a:tcPr/>
+                </a:tc>
+              </a:tr>
+              <a:tr h="370840">
+                <a:tc>
+                  <a:txBody>
+                    <a:bodyPr/>
+                    <a:lstStyle/>
+                    <a:p>
+                      <a:pPr algn="ctr"/>
+                      <a:r>
+                        <a:rPr kumimoji="1" lang="ja-JP" altLang="en-US" dirty="0" smtClean="0">
+                          <a:latin typeface="+mn-ea"/>
+                          <a:ea typeface="+mn-ea"/>
+                        </a:rPr>
+                        <a:t>㊤</a:t>
+                      </a:r>
+                      <a:endParaRPr kumimoji="1" lang="ja-JP" altLang="en-US" dirty="0">
+                        <a:latin typeface="+mn-ea"/>
+                        <a:ea typeface="+mn-ea"/>
+                      </a:endParaRPr>
+                    </a:p>
+                  </a:txBody>
+                  <a:tcPr/>
+                </a:tc>
+                <a:tc>
+                  <a:txBody>
+                    <a:bodyPr/>
+                    <a:lstStyle/>
+                    <a:p>
+                      <a:pPr algn="ctr"/>
+                      <a:r>
+                        <a:rPr kumimoji="1" lang="ja-JP" altLang="en-US" dirty="0" smtClean="0">
+                          <a:latin typeface="+mn-ea"/>
+                          <a:ea typeface="+mn-ea"/>
+                        </a:rPr>
+                        <a:t>㊥</a:t>
+                      </a:r>
+                      <a:endParaRPr kumimoji="1" lang="ja-JP" altLang="en-US" dirty="0">
+                        <a:latin typeface="+mn-ea"/>
+                        <a:ea typeface="+mn-ea"/>
+                      </a:endParaRPr>
+                    </a:p>
+                  </a:txBody>
+                  <a:tcPr/>
+                </a:tc>
+                <a:tc>
+                  <a:txBody>
+                    <a:bodyPr/>
+                    <a:lstStyle/>
+                    <a:p>
+                      <a:pPr algn="ctr"/>
+                      <a:r>
+                        <a:rPr kumimoji="1" lang="ja-JP" altLang="en-US" dirty="0" smtClean="0">
+                          <a:latin typeface="+mn-ea"/>
+                          <a:ea typeface="+mn-ea"/>
+                        </a:rPr>
+                        <a:t>㊦</a:t>
+                      </a:r>
+                      <a:endParaRPr kumimoji="1" lang="ja-JP" altLang="en-US" dirty="0">
+                        <a:latin typeface="+mn-ea"/>
+                        <a:ea typeface="+mn-ea"/>
+                      </a:endParaRPr>
+                    </a:p>
+                  </a:txBody>
+                  <a:tcPr/>
+                </a:tc>
+                <a:tc>
+                  <a:txBody>
+                    <a:bodyPr/>
+                    <a:lstStyle/>
+                    <a:p>
+                      <a:pPr algn="ctr"/>
+                      <a:r>
+                        <a:rPr kumimoji="1" lang="ja-JP" altLang="en-US" dirty="0" smtClean="0">
+                          <a:latin typeface="+mn-ea"/>
+                          <a:ea typeface="+mn-ea"/>
+                        </a:rPr>
+                        <a:t>㈱</a:t>
+                      </a:r>
+                      <a:endParaRPr kumimoji="1" lang="ja-JP" altLang="en-US" dirty="0">
+                        <a:latin typeface="+mn-ea"/>
+                        <a:ea typeface="+mn-ea"/>
+                      </a:endParaRPr>
+                    </a:p>
+                  </a:txBody>
+                  <a:tcPr/>
+                </a:tc>
+                <a:tc>
+                  <a:txBody>
+                    <a:bodyPr/>
+                    <a:lstStyle/>
+                    <a:p>
+                      <a:pPr algn="ctr"/>
+                      <a:r>
+                        <a:rPr kumimoji="1" lang="ja-JP" altLang="en-US" dirty="0" smtClean="0">
+                          <a:latin typeface="+mn-ea"/>
+                          <a:ea typeface="+mn-ea"/>
+                        </a:rPr>
+                        <a:t>㈲</a:t>
+                      </a:r>
+                      <a:endParaRPr kumimoji="1" lang="ja-JP" altLang="en-US" dirty="0">
+                        <a:latin typeface="+mn-ea"/>
+                        <a:ea typeface="+mn-ea"/>
+                      </a:endParaRPr>
+                    </a:p>
+                  </a:txBody>
+                  <a:tcPr/>
+                </a:tc>
+                <a:tc>
+                  <a:txBody>
+                    <a:bodyPr/>
+                    <a:lstStyle/>
+                    <a:p>
+                      <a:pPr algn="ctr"/>
+                      <a:r>
+                        <a:rPr lang="ja-JP" altLang="en-US" dirty="0" smtClean="0">
+                          <a:latin typeface="+mn-ea"/>
+                          <a:ea typeface="+mn-ea"/>
+                        </a:rPr>
+                        <a:t>㈹</a:t>
+                      </a:r>
+                      <a:endParaRPr kumimoji="1" lang="ja-JP" altLang="en-US" dirty="0">
+                        <a:latin typeface="+mn-ea"/>
+                        <a:ea typeface="+mn-ea"/>
+                      </a:endParaRPr>
+                    </a:p>
+                  </a:txBody>
+                  <a:tcPr/>
+                </a:tc>
+                <a:tc>
+                  <a:txBody>
+                    <a:bodyPr/>
+                    <a:lstStyle/>
+                    <a:p>
+                      <a:pPr algn="ctr"/>
+                      <a:r>
+                        <a:rPr lang="ja-JP" altLang="en-US" dirty="0" smtClean="0">
+                          <a:latin typeface="+mn-ea"/>
+                          <a:ea typeface="+mn-ea"/>
+                        </a:rPr>
+                        <a:t>∑</a:t>
+                      </a:r>
+                      <a:endParaRPr kumimoji="1" lang="ja-JP" altLang="en-US" dirty="0">
+                        <a:latin typeface="+mn-ea"/>
+                        <a:ea typeface="+mn-ea"/>
+                      </a:endParaRPr>
+                    </a:p>
+                  </a:txBody>
+                  <a:tcPr/>
+                </a:tc>
+                <a:tc>
+                  <a:txBody>
+                    <a:bodyPr/>
+                    <a:lstStyle/>
+                    <a:p>
+                      <a:pPr algn="ctr"/>
+                      <a:r>
+                        <a:rPr kumimoji="1" lang="ja-JP" altLang="en-US" dirty="0" smtClean="0">
+                          <a:latin typeface="+mn-ea"/>
+                          <a:ea typeface="+mn-ea"/>
+                        </a:rPr>
+                        <a:t>∟</a:t>
+                      </a:r>
+                      <a:endParaRPr kumimoji="1" lang="ja-JP" altLang="en-US" dirty="0">
+                        <a:latin typeface="+mn-ea"/>
+                        <a:ea typeface="+mn-ea"/>
+                      </a:endParaRPr>
+                    </a:p>
+                  </a:txBody>
+                  <a:tcPr/>
+                </a:tc>
+                <a:tc>
+                  <a:txBody>
+                    <a:bodyPr/>
+                    <a:lstStyle/>
+                    <a:p>
+                      <a:pPr algn="ctr"/>
+                      <a:r>
+                        <a:rPr kumimoji="1" lang="ja-JP" altLang="en-US" dirty="0" smtClean="0">
+                          <a:latin typeface="+mn-ea"/>
+                          <a:ea typeface="+mn-ea"/>
+                        </a:rPr>
+                        <a:t>⊿</a:t>
+                      </a:r>
+                      <a:endParaRPr kumimoji="1" lang="ja-JP" altLang="en-US" dirty="0">
+                        <a:latin typeface="+mn-ea"/>
+                        <a:ea typeface="+mn-ea"/>
+                      </a:endParaRPr>
+                    </a:p>
+                  </a:txBody>
+                  <a:tcPr/>
+                </a:tc>
+              </a:tr>
+            </a:tbl>
+          </a:graphicData>
+        </a:graphic>
+      </p:graphicFrame>
+    </p:spTree>
+    <p:extLst>
+      <p:ext uri="{BB962C8B-B14F-4D97-AF65-F5344CB8AC3E}">
+        <p14:creationId xmlns:p14="http://schemas.microsoft.com/office/powerpoint/2010/main" val="2867708175"/>
+      </p:ext>
+    </p:extLst>
+  </p:cSld>
+  <p:clrMapOvr>
+    <a:masterClrMapping/>
+  </p:clrMapOvr>
 </p:sld>
 </file>
 

</xml_diff>

<commit_message>
pdf builderror fix #1353 #1429
</commit_message>
<xml_diff>
--- a/source/ArchitectureInDetail/images_Email/materialEmail.pptx
+++ b/source/ArchitectureInDetail/images_Email/materialEmail.pptx
@@ -5766,7 +5766,7 @@
           <p:nvPr>
             <p:extLst>
               <p:ext uri="{D42A27DB-BD31-4B8C-83A1-F6EECF244321}">
-                <p14:modId xmlns:p14="http://schemas.microsoft.com/office/powerpoint/2010/main" val="3611546728"/>
+                <p14:modId xmlns:p14="http://schemas.microsoft.com/office/powerpoint/2010/main" val="4032510816"/>
               </p:ext>
             </p:extLst>
           </p:nvPr>
@@ -5917,7 +5917,14 @@
                       </a:endParaRPr>
                     </a:p>
                   </a:txBody>
-                  <a:tcPr/>
+                  <a:tcPr>
+                    <a:solidFill>
+                      <a:schemeClr val="accent1">
+                        <a:lumMod val="40000"/>
+                        <a:lumOff val="60000"/>
+                      </a:schemeClr>
+                    </a:solidFill>
+                  </a:tcPr>
                 </a:tc>
                 <a:tc>
                   <a:txBody>
@@ -5938,7 +5945,14 @@
                       </a:endParaRPr>
                     </a:p>
                   </a:txBody>
-                  <a:tcPr/>
+                  <a:tcPr>
+                    <a:solidFill>
+                      <a:schemeClr val="accent1">
+                        <a:lumMod val="40000"/>
+                        <a:lumOff val="60000"/>
+                      </a:schemeClr>
+                    </a:solidFill>
+                  </a:tcPr>
                 </a:tc>
                 <a:tc>
                   <a:txBody>
@@ -5959,7 +5973,14 @@
                       </a:endParaRPr>
                     </a:p>
                   </a:txBody>
-                  <a:tcPr/>
+                  <a:tcPr>
+                    <a:solidFill>
+                      <a:schemeClr val="accent1">
+                        <a:lumMod val="40000"/>
+                        <a:lumOff val="60000"/>
+                      </a:schemeClr>
+                    </a:solidFill>
+                  </a:tcPr>
                 </a:tc>
                 <a:tc>
                   <a:txBody>
@@ -5980,7 +6001,14 @@
                       </a:endParaRPr>
                     </a:p>
                   </a:txBody>
-                  <a:tcPr/>
+                  <a:tcPr>
+                    <a:solidFill>
+                      <a:schemeClr val="accent1">
+                        <a:lumMod val="40000"/>
+                        <a:lumOff val="60000"/>
+                      </a:schemeClr>
+                    </a:solidFill>
+                  </a:tcPr>
                 </a:tc>
                 <a:tc>
                   <a:txBody>
@@ -6001,7 +6029,14 @@
                       </a:endParaRPr>
                     </a:p>
                   </a:txBody>
-                  <a:tcPr/>
+                  <a:tcPr>
+                    <a:solidFill>
+                      <a:schemeClr val="accent1">
+                        <a:lumMod val="40000"/>
+                        <a:lumOff val="60000"/>
+                      </a:schemeClr>
+                    </a:solidFill>
+                  </a:tcPr>
                 </a:tc>
                 <a:tc>
                   <a:txBody>
@@ -6022,7 +6057,14 @@
                       </a:endParaRPr>
                     </a:p>
                   </a:txBody>
-                  <a:tcPr/>
+                  <a:tcPr>
+                    <a:solidFill>
+                      <a:schemeClr val="accent1">
+                        <a:lumMod val="40000"/>
+                        <a:lumOff val="60000"/>
+                      </a:schemeClr>
+                    </a:solidFill>
+                  </a:tcPr>
                 </a:tc>
                 <a:tc>
                   <a:txBody>
@@ -6043,7 +6085,14 @@
                       </a:endParaRPr>
                     </a:p>
                   </a:txBody>
-                  <a:tcPr/>
+                  <a:tcPr>
+                    <a:solidFill>
+                      <a:schemeClr val="accent1">
+                        <a:lumMod val="40000"/>
+                        <a:lumOff val="60000"/>
+                      </a:schemeClr>
+                    </a:solidFill>
+                  </a:tcPr>
                 </a:tc>
                 <a:tc>
                   <a:txBody>
@@ -6064,7 +6113,14 @@
                       </a:endParaRPr>
                     </a:p>
                   </a:txBody>
-                  <a:tcPr/>
+                  <a:tcPr>
+                    <a:solidFill>
+                      <a:schemeClr val="accent1">
+                        <a:lumMod val="40000"/>
+                        <a:lumOff val="60000"/>
+                      </a:schemeClr>
+                    </a:solidFill>
+                  </a:tcPr>
                 </a:tc>
                 <a:tc>
                   <a:txBody>
@@ -6085,7 +6141,14 @@
                       </a:endParaRPr>
                     </a:p>
                   </a:txBody>
-                  <a:tcPr/>
+                  <a:tcPr>
+                    <a:solidFill>
+                      <a:schemeClr val="accent1">
+                        <a:lumMod val="40000"/>
+                        <a:lumOff val="60000"/>
+                      </a:schemeClr>
+                    </a:solidFill>
+                  </a:tcPr>
                 </a:tc>
               </a:tr>
               <a:tr h="370840">
@@ -6108,7 +6171,14 @@
                       </a:endParaRPr>
                     </a:p>
                   </a:txBody>
-                  <a:tcPr/>
+                  <a:tcPr>
+                    <a:solidFill>
+                      <a:schemeClr val="accent1">
+                        <a:lumMod val="40000"/>
+                        <a:lumOff val="60000"/>
+                      </a:schemeClr>
+                    </a:solidFill>
+                  </a:tcPr>
                 </a:tc>
                 <a:tc>
                   <a:txBody>
@@ -6129,7 +6199,14 @@
                       </a:endParaRPr>
                     </a:p>
                   </a:txBody>
-                  <a:tcPr/>
+                  <a:tcPr>
+                    <a:solidFill>
+                      <a:schemeClr val="accent1">
+                        <a:lumMod val="40000"/>
+                        <a:lumOff val="60000"/>
+                      </a:schemeClr>
+                    </a:solidFill>
+                  </a:tcPr>
                 </a:tc>
                 <a:tc>
                   <a:txBody>
@@ -6150,7 +6227,14 @@
                       </a:endParaRPr>
                     </a:p>
                   </a:txBody>
-                  <a:tcPr/>
+                  <a:tcPr>
+                    <a:solidFill>
+                      <a:schemeClr val="accent1">
+                        <a:lumMod val="40000"/>
+                        <a:lumOff val="60000"/>
+                      </a:schemeClr>
+                    </a:solidFill>
+                  </a:tcPr>
                 </a:tc>
                 <a:tc>
                   <a:txBody>
@@ -6171,7 +6255,14 @@
                       </a:endParaRPr>
                     </a:p>
                   </a:txBody>
-                  <a:tcPr/>
+                  <a:tcPr>
+                    <a:solidFill>
+                      <a:schemeClr val="accent1">
+                        <a:lumMod val="40000"/>
+                        <a:lumOff val="60000"/>
+                      </a:schemeClr>
+                    </a:solidFill>
+                  </a:tcPr>
                 </a:tc>
                 <a:tc>
                   <a:txBody>
@@ -6192,7 +6283,14 @@
                       </a:endParaRPr>
                     </a:p>
                   </a:txBody>
-                  <a:tcPr/>
+                  <a:tcPr>
+                    <a:solidFill>
+                      <a:schemeClr val="accent1">
+                        <a:lumMod val="40000"/>
+                        <a:lumOff val="60000"/>
+                      </a:schemeClr>
+                    </a:solidFill>
+                  </a:tcPr>
                 </a:tc>
                 <a:tc>
                   <a:txBody>
@@ -6213,7 +6311,14 @@
                       </a:endParaRPr>
                     </a:p>
                   </a:txBody>
-                  <a:tcPr/>
+                  <a:tcPr>
+                    <a:solidFill>
+                      <a:schemeClr val="accent1">
+                        <a:lumMod val="40000"/>
+                        <a:lumOff val="60000"/>
+                      </a:schemeClr>
+                    </a:solidFill>
+                  </a:tcPr>
                 </a:tc>
                 <a:tc>
                   <a:txBody>
@@ -6234,7 +6339,14 @@
                       </a:endParaRPr>
                     </a:p>
                   </a:txBody>
-                  <a:tcPr/>
+                  <a:tcPr>
+                    <a:solidFill>
+                      <a:schemeClr val="accent1">
+                        <a:lumMod val="40000"/>
+                        <a:lumOff val="60000"/>
+                      </a:schemeClr>
+                    </a:solidFill>
+                  </a:tcPr>
                 </a:tc>
                 <a:tc>
                   <a:txBody>
@@ -6255,7 +6367,14 @@
                       </a:endParaRPr>
                     </a:p>
                   </a:txBody>
-                  <a:tcPr/>
+                  <a:tcPr>
+                    <a:solidFill>
+                      <a:schemeClr val="accent1">
+                        <a:lumMod val="40000"/>
+                        <a:lumOff val="60000"/>
+                      </a:schemeClr>
+                    </a:solidFill>
+                  </a:tcPr>
                 </a:tc>
                 <a:tc>
                   <a:txBody>
@@ -6276,7 +6395,14 @@
                       </a:endParaRPr>
                     </a:p>
                   </a:txBody>
-                  <a:tcPr/>
+                  <a:tcPr>
+                    <a:solidFill>
+                      <a:schemeClr val="accent1">
+                        <a:lumMod val="40000"/>
+                        <a:lumOff val="60000"/>
+                      </a:schemeClr>
+                    </a:solidFill>
+                  </a:tcPr>
                 </a:tc>
               </a:tr>
               <a:tr h="370840">
@@ -6299,7 +6425,14 @@
                       </a:endParaRPr>
                     </a:p>
                   </a:txBody>
-                  <a:tcPr/>
+                  <a:tcPr>
+                    <a:solidFill>
+                      <a:schemeClr val="accent1">
+                        <a:lumMod val="40000"/>
+                        <a:lumOff val="60000"/>
+                      </a:schemeClr>
+                    </a:solidFill>
+                  </a:tcPr>
                 </a:tc>
                 <a:tc>
                   <a:txBody>
@@ -6320,7 +6453,14 @@
                       </a:endParaRPr>
                     </a:p>
                   </a:txBody>
-                  <a:tcPr/>
+                  <a:tcPr>
+                    <a:solidFill>
+                      <a:schemeClr val="accent1">
+                        <a:lumMod val="40000"/>
+                        <a:lumOff val="60000"/>
+                      </a:schemeClr>
+                    </a:solidFill>
+                  </a:tcPr>
                 </a:tc>
                 <a:tc>
                   <a:txBody>
@@ -6341,7 +6481,14 @@
                       </a:endParaRPr>
                     </a:p>
                   </a:txBody>
-                  <a:tcPr/>
+                  <a:tcPr>
+                    <a:solidFill>
+                      <a:schemeClr val="accent1">
+                        <a:lumMod val="40000"/>
+                        <a:lumOff val="60000"/>
+                      </a:schemeClr>
+                    </a:solidFill>
+                  </a:tcPr>
                 </a:tc>
                 <a:tc>
                   <a:txBody>
@@ -6362,7 +6509,14 @@
                       </a:endParaRPr>
                     </a:p>
                   </a:txBody>
-                  <a:tcPr/>
+                  <a:tcPr>
+                    <a:solidFill>
+                      <a:schemeClr val="accent1">
+                        <a:lumMod val="40000"/>
+                        <a:lumOff val="60000"/>
+                      </a:schemeClr>
+                    </a:solidFill>
+                  </a:tcPr>
                 </a:tc>
                 <a:tc>
                   <a:txBody>
@@ -6383,7 +6537,14 @@
                       </a:endParaRPr>
                     </a:p>
                   </a:txBody>
-                  <a:tcPr/>
+                  <a:tcPr>
+                    <a:solidFill>
+                      <a:schemeClr val="accent1">
+                        <a:lumMod val="40000"/>
+                        <a:lumOff val="60000"/>
+                      </a:schemeClr>
+                    </a:solidFill>
+                  </a:tcPr>
                 </a:tc>
                 <a:tc>
                   <a:txBody>
@@ -6404,7 +6565,14 @@
                       </a:endParaRPr>
                     </a:p>
                   </a:txBody>
-                  <a:tcPr/>
+                  <a:tcPr>
+                    <a:solidFill>
+                      <a:schemeClr val="accent1">
+                        <a:lumMod val="40000"/>
+                        <a:lumOff val="60000"/>
+                      </a:schemeClr>
+                    </a:solidFill>
+                  </a:tcPr>
                 </a:tc>
                 <a:tc>
                   <a:txBody>
@@ -6425,7 +6593,14 @@
                       </a:endParaRPr>
                     </a:p>
                   </a:txBody>
-                  <a:tcPr/>
+                  <a:tcPr>
+                    <a:solidFill>
+                      <a:schemeClr val="accent1">
+                        <a:lumMod val="40000"/>
+                        <a:lumOff val="60000"/>
+                      </a:schemeClr>
+                    </a:solidFill>
+                  </a:tcPr>
                 </a:tc>
                 <a:tc>
                   <a:txBody>
@@ -6446,7 +6621,14 @@
                       </a:endParaRPr>
                     </a:p>
                   </a:txBody>
-                  <a:tcPr/>
+                  <a:tcPr>
+                    <a:solidFill>
+                      <a:schemeClr val="accent1">
+                        <a:lumMod val="40000"/>
+                        <a:lumOff val="60000"/>
+                      </a:schemeClr>
+                    </a:solidFill>
+                  </a:tcPr>
                 </a:tc>
                 <a:tc>
                   <a:txBody>
@@ -6467,7 +6649,14 @@
                       </a:endParaRPr>
                     </a:p>
                   </a:txBody>
-                  <a:tcPr/>
+                  <a:tcPr>
+                    <a:solidFill>
+                      <a:schemeClr val="accent1">
+                        <a:lumMod val="40000"/>
+                        <a:lumOff val="60000"/>
+                      </a:schemeClr>
+                    </a:solidFill>
+                  </a:tcPr>
                 </a:tc>
               </a:tr>
             </a:tbl>

</xml_diff>